<commit_message>
Changin background + map
</commit_message>
<xml_diff>
--- a/EXTRAS/Poster.pptx
+++ b/EXTRAS/Poster.pptx
@@ -3687,7 +3687,21 @@
                 <a:latin typeface="Times New Roman" panose="02020603050405020304" pitchFamily="18" charset="0"/>
                 <a:cs typeface="Times New Roman" panose="02020603050405020304" pitchFamily="18" charset="0"/>
               </a:rPr>
-              <a:t>In the project I use Arduino, the Arduino </a:t>
+              <a:t>In the project I use</a:t>
+            </a:r>
+            <a:r>
+              <a:rPr lang="pl-PL" sz="3900" dirty="0">
+                <a:latin typeface="Times New Roman" panose="02020603050405020304" pitchFamily="18" charset="0"/>
+                <a:cs typeface="Times New Roman" panose="02020603050405020304" pitchFamily="18" charset="0"/>
+              </a:rPr>
+              <a:t> an</a:t>
+            </a:r>
+            <a:r>
+              <a:rPr lang="en-IE" sz="3900" dirty="0">
+                <a:latin typeface="Times New Roman" panose="02020603050405020304" pitchFamily="18" charset="0"/>
+                <a:cs typeface="Times New Roman" panose="02020603050405020304" pitchFamily="18" charset="0"/>
+              </a:rPr>
+              <a:t> Arduino, the Arduino </a:t>
             </a:r>
             <a:r>
               <a:rPr lang="pl-PL" sz="3900" dirty="0">
@@ -3750,7 +3764,7 @@
                 <a:latin typeface="Times New Roman" panose="02020603050405020304" pitchFamily="18" charset="0"/>
                 <a:cs typeface="Times New Roman" panose="02020603050405020304" pitchFamily="18" charset="0"/>
               </a:rPr>
-              <a:t> and sound receiver </a:t>
+              <a:t> and sound sensor </a:t>
             </a:r>
             <a:r>
               <a:rPr lang="en-IE" sz="3900" dirty="0">
@@ -3833,7 +3847,21 @@
                 <a:latin typeface="Times New Roman" panose="02020603050405020304" pitchFamily="18" charset="0"/>
                 <a:cs typeface="Times New Roman" panose="02020603050405020304" pitchFamily="18" charset="0"/>
               </a:rPr>
-              <a:t>a database of users, and an algorithm </a:t>
+              <a:t>a database of users</a:t>
+            </a:r>
+            <a:r>
+              <a:rPr lang="pl-PL" sz="3900" dirty="0">
+                <a:latin typeface="Times New Roman" panose="02020603050405020304" pitchFamily="18" charset="0"/>
+                <a:cs typeface="Times New Roman" panose="02020603050405020304" pitchFamily="18" charset="0"/>
+              </a:rPr>
+              <a:t>, stored in Firebase</a:t>
+            </a:r>
+            <a:r>
+              <a:rPr lang="en-IE" sz="3900" dirty="0">
+                <a:latin typeface="Times New Roman" panose="02020603050405020304" pitchFamily="18" charset="0"/>
+                <a:cs typeface="Times New Roman" panose="02020603050405020304" pitchFamily="18" charset="0"/>
+              </a:rPr>
+              <a:t>, and an algorithm </a:t>
             </a:r>
             <a:r>
               <a:rPr lang="pl-PL" sz="3900" dirty="0">
@@ -3880,10 +3908,8 @@
                 <a:latin typeface="Times New Roman" panose="02020603050405020304" pitchFamily="18" charset="0"/>
                 <a:cs typeface="Times New Roman" panose="02020603050405020304" pitchFamily="18" charset="0"/>
               </a:rPr>
-              <a:t>Google API is used to display map too.</a:t>
-            </a:r>
-          </a:p>
-          <a:p>
+              <a:t>Google API is used to display a map.</a:t>
+            </a:r>
             <a:endParaRPr lang="pl-PL" sz="4000" dirty="0">
               <a:latin typeface="Times New Roman" panose="02020603050405020304" pitchFamily="18" charset="0"/>
               <a:cs typeface="Times New Roman" panose="02020603050405020304" pitchFamily="18" charset="0"/>
@@ -3991,7 +4017,7 @@
         </p:nvSpPr>
         <p:spPr>
           <a:xfrm>
-            <a:off x="7751457" y="3983604"/>
+            <a:off x="7516855" y="3833868"/>
             <a:ext cx="15006544" cy="13278405"/>
           </a:xfrm>
           <a:prstGeom prst="roundRect">
@@ -4228,8 +4254,8 @@
         </p:nvSpPr>
         <p:spPr>
           <a:xfrm>
-            <a:off x="22928678" y="12022289"/>
-            <a:ext cx="7237203" cy="5239720"/>
+            <a:off x="22758358" y="10691812"/>
+            <a:ext cx="7407523" cy="6570197"/>
           </a:xfrm>
           <a:prstGeom prst="roundRect">
             <a:avLst/>
@@ -4290,7 +4316,20 @@
                 <a:latin typeface="Times New Roman" panose="02020603050405020304" pitchFamily="18" charset="0"/>
                 <a:cs typeface="Times New Roman" panose="02020603050405020304" pitchFamily="18" charset="0"/>
               </a:rPr>
-              <a:t>Escapes</a:t>
+              <a:t>Routing Applications</a:t>
+            </a:r>
+          </a:p>
+          <a:p>
+            <a:pPr marL="685800" indent="-685800">
+              <a:buFont typeface="Arial" panose="020B0604020202020204" pitchFamily="34" charset="0"/>
+              <a:buChar char="•"/>
+            </a:pPr>
+            <a:r>
+              <a:rPr lang="pl-PL" sz="4000" dirty="0">
+                <a:latin typeface="Times New Roman" panose="02020603050405020304" pitchFamily="18" charset="0"/>
+                <a:cs typeface="Times New Roman" panose="02020603050405020304" pitchFamily="18" charset="0"/>
+              </a:rPr>
+              <a:t>Arduino Mobile Applications</a:t>
             </a:r>
           </a:p>
           <a:p>
@@ -4341,7 +4380,7 @@
         </p:blipFill>
         <p:spPr bwMode="auto">
           <a:xfrm>
-            <a:off x="12597765" y="5405609"/>
+            <a:off x="12455354" y="5647367"/>
             <a:ext cx="5269642" cy="3955726"/>
           </a:xfrm>
           <a:prstGeom prst="rect">
@@ -4373,7 +4412,7 @@
         </p:nvSpPr>
         <p:spPr>
           <a:xfrm>
-            <a:off x="13463532" y="5265210"/>
+            <a:off x="13348321" y="5701519"/>
             <a:ext cx="1203960" cy="1059180"/>
           </a:xfrm>
           <a:prstGeom prst="rect">
@@ -4442,7 +4481,7 @@
         </p:blipFill>
         <p:spPr bwMode="auto">
           <a:xfrm rot="11475800">
-            <a:off x="13515439" y="5372315"/>
+            <a:off x="13279607" y="5748433"/>
             <a:ext cx="965351" cy="965351"/>
           </a:xfrm>
           <a:prstGeom prst="rect">
@@ -4474,8 +4513,8 @@
         </p:nvSpPr>
         <p:spPr>
           <a:xfrm>
-            <a:off x="14629294" y="9631926"/>
-            <a:ext cx="866664" cy="1981200"/>
+            <a:off x="14434990" y="10376535"/>
+            <a:ext cx="866664" cy="1457966"/>
           </a:xfrm>
           <a:prstGeom prst="downArrow">
             <a:avLst/>
@@ -4535,8 +4574,8 @@
         </p:blipFill>
         <p:spPr bwMode="auto">
           <a:xfrm>
-            <a:off x="18396029" y="8526943"/>
-            <a:ext cx="4145339" cy="7369493"/>
+            <a:off x="18736228" y="10955138"/>
+            <a:ext cx="3089389" cy="5492247"/>
           </a:xfrm>
           <a:prstGeom prst="rect">
             <a:avLst/>
@@ -4582,8 +4621,8 @@
         </p:blipFill>
         <p:spPr bwMode="auto">
           <a:xfrm>
-            <a:off x="8101941" y="8495580"/>
-            <a:ext cx="4145340" cy="7369493"/>
+            <a:off x="8311122" y="10955138"/>
+            <a:ext cx="3089389" cy="5492247"/>
           </a:xfrm>
           <a:prstGeom prst="rect">
             <a:avLst/>
@@ -4614,7 +4653,7 @@
         </p:nvSpPr>
         <p:spPr>
           <a:xfrm>
-            <a:off x="8254804" y="7563405"/>
+            <a:off x="8100151" y="10276557"/>
             <a:ext cx="3640661" cy="692497"/>
           </a:xfrm>
           <a:prstGeom prst="rect">
@@ -4636,7 +4675,7 @@
                 <a:latin typeface="Times New Roman" panose="02020603050405020304" pitchFamily="18" charset="0"/>
                 <a:cs typeface="Times New Roman" panose="02020603050405020304" pitchFamily="18" charset="0"/>
               </a:rPr>
-              <a:t>Starting Point:</a:t>
+              <a:t>No Route</a:t>
             </a:r>
             <a:endParaRPr lang="en-IE" sz="3900" dirty="0">
               <a:solidFill>
@@ -4662,7 +4701,7 @@
         </p:nvSpPr>
         <p:spPr>
           <a:xfrm>
-            <a:off x="19117340" y="7785318"/>
+            <a:off x="18617566" y="10178301"/>
             <a:ext cx="3640661" cy="692497"/>
           </a:xfrm>
           <a:prstGeom prst="rect">
@@ -4677,14 +4716,14 @@
           <a:lstStyle/>
           <a:p>
             <a:r>
-              <a:rPr lang="pl-PL" sz="3900" dirty="0">
+              <a:rPr lang="pl-PL" sz="3900">
                 <a:solidFill>
                   <a:schemeClr val="bg1"/>
                 </a:solidFill>
                 <a:latin typeface="Times New Roman" panose="02020603050405020304" pitchFamily="18" charset="0"/>
                 <a:cs typeface="Times New Roman" panose="02020603050405020304" pitchFamily="18" charset="0"/>
               </a:rPr>
-              <a:t>End Point:</a:t>
+              <a:t>Route Drawn</a:t>
             </a:r>
             <a:endParaRPr lang="en-IE" sz="3900" dirty="0">
               <a:solidFill>
@@ -4710,8 +4749,8 @@
         </p:nvSpPr>
         <p:spPr>
           <a:xfrm>
-            <a:off x="16022815" y="10717638"/>
-            <a:ext cx="2146162" cy="775504"/>
+            <a:off x="16385143" y="13137982"/>
+            <a:ext cx="1880245" cy="496326"/>
           </a:xfrm>
           <a:prstGeom prst="rightArrow">
             <a:avLst/>
@@ -4756,8 +4795,8 @@
         </p:nvSpPr>
         <p:spPr>
           <a:xfrm>
-            <a:off x="12102412" y="10717638"/>
-            <a:ext cx="2146162" cy="775504"/>
+            <a:off x="11740812" y="13129678"/>
+            <a:ext cx="1880245" cy="515984"/>
           </a:xfrm>
           <a:prstGeom prst="rightArrow">
             <a:avLst/>
@@ -4802,7 +4841,7 @@
         </p:nvSpPr>
         <p:spPr>
           <a:xfrm>
-            <a:off x="13762892" y="12022289"/>
+            <a:off x="13768919" y="12266982"/>
             <a:ext cx="3165231" cy="3693319"/>
           </a:xfrm>
           <a:prstGeom prst="rect">
@@ -4824,7 +4863,7 @@
                 <a:latin typeface="Times New Roman" panose="02020603050405020304" pitchFamily="18" charset="0"/>
                 <a:cs typeface="Times New Roman" panose="02020603050405020304" pitchFamily="18" charset="0"/>
               </a:rPr>
-              <a:t>Alarm Is Received Through Arduino and Bluetooth Module</a:t>
+              <a:t>Alarm Is Received Through a Bluetooth Module and a Sound Sensor</a:t>
             </a:r>
             <a:endParaRPr lang="en-IE" sz="3900" dirty="0">
               <a:solidFill>
@@ -4850,7 +4889,7 @@
         </p:nvSpPr>
         <p:spPr>
           <a:xfrm>
-            <a:off x="22888643" y="5511705"/>
+            <a:off x="22888643" y="4827139"/>
             <a:ext cx="7277238" cy="5544221"/>
           </a:xfrm>
           <a:prstGeom prst="roundRect">
@@ -4886,7 +4925,7 @@
                 <a:latin typeface="Times New Roman" panose="02020603050405020304" pitchFamily="18" charset="0"/>
                 <a:cs typeface="Times New Roman" panose="02020603050405020304" pitchFamily="18" charset="0"/>
               </a:rPr>
-              <a:t>Things Learnt</a:t>
+              <a:t>Things I learned</a:t>
             </a:r>
           </a:p>
           <a:p>
@@ -4973,6 +5012,192 @@
           </a:p>
         </p:txBody>
       </p:sp>
+      <p:sp>
+        <p:nvSpPr>
+          <p:cNvPr id="5" name="Arrow: Right 4">
+            <a:extLst>
+              <a:ext uri="{FF2B5EF4-FFF2-40B4-BE49-F238E27FC236}">
+                <a16:creationId xmlns:a16="http://schemas.microsoft.com/office/drawing/2014/main" id="{3C5026EF-E6D3-4814-B79B-00BADD6FEE46}"/>
+              </a:ext>
+            </a:extLst>
+          </p:cNvPr>
+          <p:cNvSpPr/>
+          <p:nvPr/>
+        </p:nvSpPr>
+        <p:spPr>
+          <a:xfrm>
+            <a:off x="17789885" y="7488526"/>
+            <a:ext cx="951006" cy="648719"/>
+          </a:xfrm>
+          <a:prstGeom prst="rightArrow">
+            <a:avLst/>
+          </a:prstGeom>
+        </p:spPr>
+        <p:style>
+          <a:lnRef idx="2">
+            <a:schemeClr val="accent1">
+              <a:shade val="50000"/>
+            </a:schemeClr>
+          </a:lnRef>
+          <a:fillRef idx="1">
+            <a:schemeClr val="accent1"/>
+          </a:fillRef>
+          <a:effectRef idx="0">
+            <a:schemeClr val="accent1"/>
+          </a:effectRef>
+          <a:fontRef idx="minor">
+            <a:schemeClr val="lt1"/>
+          </a:fontRef>
+        </p:style>
+        <p:txBody>
+          <a:bodyPr rtlCol="0" anchor="ctr"/>
+          <a:lstStyle/>
+          <a:p>
+            <a:pPr algn="ctr"/>
+            <a:endParaRPr lang="en-IE"/>
+          </a:p>
+        </p:txBody>
+      </p:sp>
+      <p:sp>
+        <p:nvSpPr>
+          <p:cNvPr id="32" name="Arrow: Right 31">
+            <a:extLst>
+              <a:ext uri="{FF2B5EF4-FFF2-40B4-BE49-F238E27FC236}">
+                <a16:creationId xmlns:a16="http://schemas.microsoft.com/office/drawing/2014/main" id="{1C4D7B3F-D9ED-4DD4-9F8A-D573DD3F468C}"/>
+              </a:ext>
+            </a:extLst>
+          </p:cNvPr>
+          <p:cNvSpPr/>
+          <p:nvPr/>
+        </p:nvSpPr>
+        <p:spPr>
+          <a:xfrm rot="10800000">
+            <a:off x="11432487" y="7488527"/>
+            <a:ext cx="951006" cy="648719"/>
+          </a:xfrm>
+          <a:prstGeom prst="rightArrow">
+            <a:avLst/>
+          </a:prstGeom>
+        </p:spPr>
+        <p:style>
+          <a:lnRef idx="2">
+            <a:schemeClr val="accent1">
+              <a:shade val="50000"/>
+            </a:schemeClr>
+          </a:lnRef>
+          <a:fillRef idx="1">
+            <a:schemeClr val="accent1"/>
+          </a:fillRef>
+          <a:effectRef idx="0">
+            <a:schemeClr val="accent1"/>
+          </a:effectRef>
+          <a:fontRef idx="minor">
+            <a:schemeClr val="lt1"/>
+          </a:fontRef>
+        </p:style>
+        <p:txBody>
+          <a:bodyPr rtlCol="0" anchor="ctr"/>
+          <a:lstStyle/>
+          <a:p>
+            <a:pPr algn="ctr"/>
+            <a:endParaRPr lang="en-IE"/>
+          </a:p>
+        </p:txBody>
+      </p:sp>
+      <p:pic>
+        <p:nvPicPr>
+          <p:cNvPr id="13" name="Picture 6" descr="https://scontent-dub4-1.xx.fbcdn.net/v/t1.15752-9/55492858_398401657655248_5820430342556745728_n.jpg?_nc_cat=103&amp;_nc_ht=scontent-dub4-1.xx&amp;oh=5f53a3d00810876fb0a425ccf63d4563&amp;oe=5D12DDE7">
+            <a:extLst>
+              <a:ext uri="{FF2B5EF4-FFF2-40B4-BE49-F238E27FC236}">
+                <a16:creationId xmlns:a16="http://schemas.microsoft.com/office/drawing/2014/main" id="{B1C021FF-2D76-4576-B331-5C3E7F78398D}"/>
+              </a:ext>
+            </a:extLst>
+          </p:cNvPr>
+          <p:cNvPicPr>
+            <a:picLocks noChangeAspect="1" noChangeArrowheads="1"/>
+          </p:cNvPicPr>
+          <p:nvPr/>
+        </p:nvPicPr>
+        <p:blipFill>
+          <a:blip r:embed="rId14">
+            <a:extLst>
+              <a:ext uri="{28A0092B-C50C-407E-A947-70E740481C1C}">
+                <a14:useLocalDpi xmlns:a14="http://schemas.microsoft.com/office/drawing/2010/main" val="0"/>
+              </a:ext>
+            </a:extLst>
+          </a:blip>
+          <a:srcRect/>
+          <a:stretch>
+            <a:fillRect/>
+          </a:stretch>
+        </p:blipFill>
+        <p:spPr bwMode="auto">
+          <a:xfrm>
+            <a:off x="18743390" y="4643884"/>
+            <a:ext cx="3089389" cy="5492247"/>
+          </a:xfrm>
+          <a:prstGeom prst="rect">
+            <a:avLst/>
+          </a:prstGeom>
+          <a:noFill/>
+          <a:extLst>
+            <a:ext uri="{909E8E84-426E-40DD-AFC4-6F175D3DCCD1}">
+              <a14:hiddenFill xmlns:a14="http://schemas.microsoft.com/office/drawing/2010/main">
+                <a:solidFill>
+                  <a:srgbClr val="FFFFFF"/>
+                </a:solidFill>
+              </a14:hiddenFill>
+            </a:ext>
+          </a:extLst>
+        </p:spPr>
+      </p:pic>
+      <p:pic>
+        <p:nvPicPr>
+          <p:cNvPr id="15" name="Picture 8" descr="https://scontent-dub4-1.xx.fbcdn.net/v/t1.15752-9/55669623_353453958619755_8894604677031657472_n.jpg?_nc_cat=111&amp;_nc_ht=scontent-dub4-1.xx&amp;oh=6622d93056fc0ec05ec80434bcf87ba0&amp;oe=5D4417D2">
+            <a:extLst>
+              <a:ext uri="{FF2B5EF4-FFF2-40B4-BE49-F238E27FC236}">
+                <a16:creationId xmlns:a16="http://schemas.microsoft.com/office/drawing/2014/main" id="{B8E4FBB6-ACC0-4619-9299-1F0D3DC78BEE}"/>
+              </a:ext>
+            </a:extLst>
+          </p:cNvPr>
+          <p:cNvPicPr>
+            <a:picLocks noChangeAspect="1" noChangeArrowheads="1"/>
+          </p:cNvPicPr>
+          <p:nvPr/>
+        </p:nvPicPr>
+        <p:blipFill>
+          <a:blip r:embed="rId15">
+            <a:extLst>
+              <a:ext uri="{28A0092B-C50C-407E-A947-70E740481C1C}">
+                <a14:useLocalDpi xmlns:a14="http://schemas.microsoft.com/office/drawing/2010/main" val="0"/>
+              </a:ext>
+            </a:extLst>
+          </a:blip>
+          <a:srcRect/>
+          <a:stretch>
+            <a:fillRect/>
+          </a:stretch>
+        </p:blipFill>
+        <p:spPr bwMode="auto">
+          <a:xfrm>
+            <a:off x="8311123" y="4686054"/>
+            <a:ext cx="3089389" cy="5492247"/>
+          </a:xfrm>
+          <a:prstGeom prst="rect">
+            <a:avLst/>
+          </a:prstGeom>
+          <a:noFill/>
+          <a:extLst>
+            <a:ext uri="{909E8E84-426E-40DD-AFC4-6F175D3DCCD1}">
+              <a14:hiddenFill xmlns:a14="http://schemas.microsoft.com/office/drawing/2010/main">
+                <a:solidFill>
+                  <a:srgbClr val="FFFFFF"/>
+                </a:solidFill>
+              </a14:hiddenFill>
+            </a:ext>
+          </a:extLst>
+        </p:spPr>
+      </p:pic>
     </p:spTree>
     <p:extLst>
       <p:ext uri="{BB962C8B-B14F-4D97-AF65-F5344CB8AC3E}">

</xml_diff>